<commit_message>
Presentation of this Project
</commit_message>
<xml_diff>
--- a/Facebook Comment Prediction.pptx
+++ b/Facebook Comment Prediction.pptx
@@ -11289,8 +11289,8 @@
         </p:nvSpPr>
         <p:spPr>
           <a:xfrm>
-            <a:off x="96253" y="467819"/>
-            <a:ext cx="9047747" cy="3973551"/>
+            <a:off x="319775" y="618767"/>
+            <a:ext cx="8512500" cy="3595724"/>
           </a:xfrm>
           <a:prstGeom prst="rect">
             <a:avLst/>
@@ -11440,7 +11440,7 @@
               <a:buNone/>
             </a:pPr>
             <a:r>
-              <a:rPr lang="en-GB" sz="2400" b="1" u="sng" dirty="0" smtClean="0">
+              <a:rPr lang="en-IN" sz="2400" b="1" u="sng" smtClean="0">
                 <a:solidFill>
                   <a:schemeClr val="lt1"/>
                 </a:solidFill>

</xml_diff>